<commit_message>
Deployed 7b1850e with MkDocs version: 1.1.2
</commit_message>
<xml_diff>
--- a/badges.pptx
+++ b/badges.pptx
@@ -2985,17 +2985,20 @@
         <p:spPr>
           <a:xfrm>
             <a:off x="988078" y="390426"/>
-            <a:ext cx="6135394" cy="863188"/>
+            <a:ext cx="5840425" cy="538722"/>
           </a:xfrm>
         </p:spPr>
         <p:txBody>
-          <a:bodyPr/>
-          <a:lstStyle/>
-          <a:p>
-            <a:r>
-              <a:rPr lang="en-US" dirty="0"/>
-              <a:t>CoderDojo Badges</a:t>
-            </a:r>
+          <a:bodyPr>
+            <a:normAutofit fontScale="90000"/>
+          </a:bodyPr>
+          <a:lstStyle/>
+          <a:p>
+            <a:r>
+              <a:rPr lang="en-US"/>
+              <a:t>CoderDojo</a:t>
+            </a:r>
+            <a:endParaRPr lang="en-US" dirty="0"/>
           </a:p>
         </p:txBody>
       </p:sp>

</xml_diff>